<commit_message>
Made error box transparent
</commit_message>
<xml_diff>
--- a/slides/03-Closures.pptx
+++ b/slides/03-Closures.pptx
@@ -209,7 +209,7 @@
           <a:p>
             <a:fld id="{27CEEA13-23F5-194B-B1CF-CF175090CBFA}" type="datetimeFigureOut">
               <a:rPr lang="en-US" smtClean="0"/>
-              <a:t>2/9/20</a:t>
+              <a:t>2/10/20</a:t>
             </a:fld>
             <a:endParaRPr lang="en-US"/>
           </a:p>
@@ -637,7 +637,7 @@
           <a:p>
             <a:fld id="{2DD5D53E-635E-BD41-B5CC-A796D6DD661B}" type="datetimeFigureOut">
               <a:rPr lang="en-US" smtClean="0"/>
-              <a:t>2/9/20</a:t>
+              <a:t>2/10/20</a:t>
             </a:fld>
             <a:endParaRPr lang="en-US"/>
           </a:p>
@@ -967,7 +967,7 @@
           <a:p>
             <a:fld id="{2DD5D53E-635E-BD41-B5CC-A796D6DD661B}" type="datetimeFigureOut">
               <a:rPr lang="en-US" smtClean="0"/>
-              <a:t>2/9/20</a:t>
+              <a:t>2/10/20</a:t>
             </a:fld>
             <a:endParaRPr lang="en-US"/>
           </a:p>
@@ -1147,7 +1147,7 @@
           <a:p>
             <a:fld id="{2DD5D53E-635E-BD41-B5CC-A796D6DD661B}" type="datetimeFigureOut">
               <a:rPr lang="en-US" smtClean="0"/>
-              <a:t>2/9/20</a:t>
+              <a:t>2/10/20</a:t>
             </a:fld>
             <a:endParaRPr lang="en-US"/>
           </a:p>
@@ -1317,7 +1317,7 @@
           <a:p>
             <a:fld id="{2DD5D53E-635E-BD41-B5CC-A796D6DD661B}" type="datetimeFigureOut">
               <a:rPr lang="en-US" smtClean="0"/>
-              <a:t>2/9/20</a:t>
+              <a:t>2/10/20</a:t>
             </a:fld>
             <a:endParaRPr lang="en-US"/>
           </a:p>
@@ -1589,7 +1589,7 @@
           <a:p>
             <a:fld id="{2DD5D53E-635E-BD41-B5CC-A796D6DD661B}" type="datetimeFigureOut">
               <a:rPr lang="en-US" smtClean="0"/>
-              <a:t>2/9/20</a:t>
+              <a:t>2/10/20</a:t>
             </a:fld>
             <a:endParaRPr lang="en-US"/>
           </a:p>
@@ -1983,7 +1983,7 @@
           <a:p>
             <a:fld id="{2DD5D53E-635E-BD41-B5CC-A796D6DD661B}" type="datetimeFigureOut">
               <a:rPr lang="en-US" smtClean="0"/>
-              <a:t>2/9/20</a:t>
+              <a:t>2/10/20</a:t>
             </a:fld>
             <a:endParaRPr lang="en-US"/>
           </a:p>
@@ -2460,7 +2460,7 @@
           <a:p>
             <a:fld id="{2DD5D53E-635E-BD41-B5CC-A796D6DD661B}" type="datetimeFigureOut">
               <a:rPr lang="en-US" smtClean="0"/>
-              <a:t>2/9/20</a:t>
+              <a:t>2/10/20</a:t>
             </a:fld>
             <a:endParaRPr lang="en-US"/>
           </a:p>
@@ -2578,7 +2578,7 @@
           <a:p>
             <a:fld id="{2DD5D53E-635E-BD41-B5CC-A796D6DD661B}" type="datetimeFigureOut">
               <a:rPr lang="en-US" smtClean="0"/>
-              <a:t>2/9/20</a:t>
+              <a:t>2/10/20</a:t>
             </a:fld>
             <a:endParaRPr lang="en-US"/>
           </a:p>
@@ -2673,7 +2673,7 @@
           <a:p>
             <a:fld id="{2DD5D53E-635E-BD41-B5CC-A796D6DD661B}" type="datetimeFigureOut">
               <a:rPr lang="en-US" smtClean="0"/>
-              <a:t>2/9/20</a:t>
+              <a:t>2/10/20</a:t>
             </a:fld>
             <a:endParaRPr lang="en-US"/>
           </a:p>
@@ -3019,7 +3019,7 @@
           <a:p>
             <a:fld id="{2DD5D53E-635E-BD41-B5CC-A796D6DD661B}" type="datetimeFigureOut">
               <a:rPr lang="en-US" smtClean="0"/>
-              <a:t>2/9/20</a:t>
+              <a:t>2/10/20</a:t>
             </a:fld>
             <a:endParaRPr lang="en-US"/>
           </a:p>
@@ -3407,7 +3407,7 @@
           <a:p>
             <a:fld id="{2DD5D53E-635E-BD41-B5CC-A796D6DD661B}" type="datetimeFigureOut">
               <a:rPr lang="en-US" smtClean="0"/>
-              <a:t>2/9/20</a:t>
+              <a:t>2/10/20</a:t>
             </a:fld>
             <a:endParaRPr lang="en-US"/>
           </a:p>
@@ -3682,7 +3682,7 @@
           <a:p>
             <a:fld id="{2DD5D53E-635E-BD41-B5CC-A796D6DD661B}" type="datetimeFigureOut">
               <a:rPr lang="en-US" smtClean="0"/>
-              <a:t>2/9/20</a:t>
+              <a:t>2/10/20</a:t>
             </a:fld>
             <a:endParaRPr lang="en-US"/>
           </a:p>
@@ -30185,9 +30185,7 @@
           <a:prstGeom prst="rect">
             <a:avLst/>
           </a:prstGeom>
-          <a:solidFill>
-            <a:schemeClr val="bg1"/>
-          </a:solidFill>
+          <a:noFill/>
           <a:ln>
             <a:noFill/>
           </a:ln>
@@ -31083,7 +31081,9 @@
                                         </p:cTn>
                                         <p:tgtEl>
                                           <p:spTgt spid="6">
-                                            <p:bg/>
+                                            <p:txEl>
+                                              <p:pRg st="0" end="0"/>
+                                            </p:txEl>
                                           </p:spTgt>
                                         </p:tgtEl>
                                         <p:attrNameLst>
@@ -31099,7 +31099,9 @@
                                         <p:cTn id="57" dur="500"/>
                                         <p:tgtEl>
                                           <p:spTgt spid="6">
-                                            <p:bg/>
+                                            <p:txEl>
+                                              <p:pRg st="0" end="0"/>
+                                            </p:txEl>
                                           </p:spTgt>
                                         </p:tgtEl>
                                       </p:cBhvr>
@@ -31123,7 +31125,7 @@
                                         <p:tgtEl>
                                           <p:spTgt spid="6">
                                             <p:txEl>
-                                              <p:pRg st="0" end="0"/>
+                                              <p:pRg st="1" end="1"/>
                                             </p:txEl>
                                           </p:spTgt>
                                         </p:tgtEl>
@@ -31138,49 +31140,6 @@
                                     <p:animEffect transition="in" filter="wipe(left)">
                                       <p:cBhvr>
                                         <p:cTn id="60" dur="500"/>
-                                        <p:tgtEl>
-                                          <p:spTgt spid="6">
-                                            <p:txEl>
-                                              <p:pRg st="0" end="0"/>
-                                            </p:txEl>
-                                          </p:spTgt>
-                                        </p:tgtEl>
-                                      </p:cBhvr>
-                                    </p:animEffect>
-                                  </p:childTnLst>
-                                </p:cTn>
-                              </p:par>
-                              <p:par>
-                                <p:cTn id="61" presetID="22" presetClass="entr" presetSubtype="8" fill="hold" grpId="0" nodeType="withEffect">
-                                  <p:stCondLst>
-                                    <p:cond delay="0"/>
-                                  </p:stCondLst>
-                                  <p:childTnLst>
-                                    <p:set>
-                                      <p:cBhvr>
-                                        <p:cTn id="62" dur="1" fill="hold">
-                                          <p:stCondLst>
-                                            <p:cond delay="0"/>
-                                          </p:stCondLst>
-                                        </p:cTn>
-                                        <p:tgtEl>
-                                          <p:spTgt spid="6">
-                                            <p:txEl>
-                                              <p:pRg st="1" end="1"/>
-                                            </p:txEl>
-                                          </p:spTgt>
-                                        </p:tgtEl>
-                                        <p:attrNameLst>
-                                          <p:attrName>style.visibility</p:attrName>
-                                        </p:attrNameLst>
-                                      </p:cBhvr>
-                                      <p:to>
-                                        <p:strVal val="visible"/>
-                                      </p:to>
-                                    </p:set>
-                                    <p:animEffect transition="in" filter="wipe(left)">
-                                      <p:cBhvr>
-                                        <p:cTn id="63" dur="500"/>
                                         <p:tgtEl>
                                           <p:spTgt spid="6">
                                             <p:txEl>
@@ -31200,26 +31159,26 @@
                     </p:cTn>
                   </p:par>
                   <p:par>
-                    <p:cTn id="64" fill="hold">
+                    <p:cTn id="61" fill="hold">
                       <p:stCondLst>
                         <p:cond delay="indefinite"/>
                       </p:stCondLst>
                       <p:childTnLst>
                         <p:par>
-                          <p:cTn id="65" fill="hold">
+                          <p:cTn id="62" fill="hold">
                             <p:stCondLst>
                               <p:cond delay="0"/>
                             </p:stCondLst>
                             <p:childTnLst>
                               <p:par>
-                                <p:cTn id="66" presetID="22" presetClass="entr" presetSubtype="8" fill="hold" grpId="0" nodeType="clickEffect">
+                                <p:cTn id="63" presetID="22" presetClass="entr" presetSubtype="8" fill="hold" grpId="0" nodeType="clickEffect">
                                   <p:stCondLst>
                                     <p:cond delay="0"/>
                                   </p:stCondLst>
                                   <p:childTnLst>
                                     <p:set>
                                       <p:cBhvr>
-                                        <p:cTn id="67" dur="1" fill="hold">
+                                        <p:cTn id="64" dur="1" fill="hold">
                                           <p:stCondLst>
                                             <p:cond delay="0"/>
                                           </p:stCondLst>
@@ -31241,7 +31200,7 @@
                                     </p:set>
                                     <p:animEffect transition="in" filter="wipe(left)">
                                       <p:cBhvr>
-                                        <p:cTn id="68" dur="500"/>
+                                        <p:cTn id="65" dur="500"/>
                                         <p:tgtEl>
                                           <p:spTgt spid="4">
                                             <p:txEl>
@@ -31261,26 +31220,26 @@
                     </p:cTn>
                   </p:par>
                   <p:par>
-                    <p:cTn id="69" fill="hold">
+                    <p:cTn id="66" fill="hold">
                       <p:stCondLst>
                         <p:cond delay="indefinite"/>
                       </p:stCondLst>
                       <p:childTnLst>
                         <p:par>
-                          <p:cTn id="70" fill="hold">
+                          <p:cTn id="67" fill="hold">
                             <p:stCondLst>
                               <p:cond delay="0"/>
                             </p:stCondLst>
                             <p:childTnLst>
                               <p:par>
-                                <p:cTn id="71" presetID="1" presetClass="exit" presetSubtype="0" fill="hold" grpId="1" nodeType="clickEffect">
+                                <p:cTn id="68" presetID="1" presetClass="exit" presetSubtype="0" fill="hold" grpId="1" nodeType="clickEffect">
                                   <p:stCondLst>
                                     <p:cond delay="0"/>
                                   </p:stCondLst>
                                   <p:childTnLst>
                                     <p:set>
                                       <p:cBhvr>
-                                        <p:cTn id="72" dur="1" fill="hold">
+                                        <p:cTn id="69" dur="1" fill="hold">
                                           <p:stCondLst>
                                             <p:cond delay="0"/>
                                           </p:stCondLst>
@@ -31304,14 +31263,14 @@
                                 </p:cTn>
                               </p:par>
                               <p:par>
-                                <p:cTn id="73" presetID="1" presetClass="exit" presetSubtype="0" fill="hold" grpId="1" nodeType="withEffect">
+                                <p:cTn id="70" presetID="1" presetClass="exit" presetSubtype="0" fill="hold" grpId="1" nodeType="withEffect">
                                   <p:stCondLst>
                                     <p:cond delay="0"/>
                                   </p:stCondLst>
                                   <p:childTnLst>
                                     <p:set>
                                       <p:cBhvr>
-                                        <p:cTn id="74" dur="1" fill="hold">
+                                        <p:cTn id="71" dur="1" fill="hold">
                                           <p:stCondLst>
                                             <p:cond delay="0"/>
                                           </p:stCondLst>
@@ -31334,22 +31293,42 @@
                                   </p:childTnLst>
                                 </p:cTn>
                               </p:par>
+                            </p:childTnLst>
+                          </p:cTn>
+                        </p:par>
+                      </p:childTnLst>
+                    </p:cTn>
+                  </p:par>
+                  <p:par>
+                    <p:cTn id="72" fill="hold">
+                      <p:stCondLst>
+                        <p:cond delay="indefinite"/>
+                      </p:stCondLst>
+                      <p:childTnLst>
+                        <p:par>
+                          <p:cTn id="73" fill="hold">
+                            <p:stCondLst>
+                              <p:cond delay="0"/>
+                            </p:stCondLst>
+                            <p:childTnLst>
                               <p:par>
-                                <p:cTn id="75" presetID="1" presetClass="exit" presetSubtype="0" fill="hold" grpId="1" nodeType="withEffect">
+                                <p:cTn id="74" presetID="22" presetClass="entr" presetSubtype="8" fill="hold" grpId="0" nodeType="clickEffect">
                                   <p:stCondLst>
                                     <p:cond delay="0"/>
                                   </p:stCondLst>
                                   <p:childTnLst>
                                     <p:set>
                                       <p:cBhvr>
-                                        <p:cTn id="76" dur="1" fill="hold">
+                                        <p:cTn id="75" dur="1" fill="hold">
                                           <p:stCondLst>
                                             <p:cond delay="0"/>
                                           </p:stCondLst>
                                         </p:cTn>
                                         <p:tgtEl>
-                                          <p:spTgt spid="6">
-                                            <p:bg/>
+                                          <p:spTgt spid="4">
+                                            <p:txEl>
+                                              <p:pRg st="13" end="13"/>
+                                            </p:txEl>
                                           </p:spTgt>
                                         </p:tgtEl>
                                         <p:attrNameLst>
@@ -31357,9 +31336,21 @@
                                         </p:attrNameLst>
                                       </p:cBhvr>
                                       <p:to>
-                                        <p:strVal val="hidden"/>
+                                        <p:strVal val="visible"/>
                                       </p:to>
                                     </p:set>
+                                    <p:animEffect transition="in" filter="wipe(left)">
+                                      <p:cBhvr>
+                                        <p:cTn id="76" dur="500"/>
+                                        <p:tgtEl>
+                                          <p:spTgt spid="4">
+                                            <p:txEl>
+                                              <p:pRg st="13" end="13"/>
+                                            </p:txEl>
+                                          </p:spTgt>
+                                        </p:tgtEl>
+                                      </p:cBhvr>
+                                    </p:animEffect>
                                   </p:childTnLst>
                                 </p:cTn>
                               </p:par>
@@ -31397,7 +31388,7 @@
                                         <p:tgtEl>
                                           <p:spTgt spid="4">
                                             <p:txEl>
-                                              <p:pRg st="13" end="13"/>
+                                              <p:pRg st="14" end="14"/>
                                             </p:txEl>
                                           </p:spTgt>
                                         </p:tgtEl>
@@ -31415,7 +31406,7 @@
                                         <p:tgtEl>
                                           <p:spTgt spid="4">
                                             <p:txEl>
-                                              <p:pRg st="13" end="13"/>
+                                              <p:pRg st="14" end="14"/>
                                             </p:txEl>
                                           </p:spTgt>
                                         </p:tgtEl>
@@ -31458,7 +31449,7 @@
                                         <p:tgtEl>
                                           <p:spTgt spid="4">
                                             <p:txEl>
-                                              <p:pRg st="14" end="14"/>
+                                              <p:pRg st="8" end="8"/>
                                             </p:txEl>
                                           </p:spTgt>
                                         </p:tgtEl>
@@ -31476,7 +31467,7 @@
                                         <p:tgtEl>
                                           <p:spTgt spid="4">
                                             <p:txEl>
-                                              <p:pRg st="14" end="14"/>
+                                              <p:pRg st="8" end="8"/>
                                             </p:txEl>
                                           </p:spTgt>
                                         </p:tgtEl>
@@ -31519,7 +31510,7 @@
                                         <p:tgtEl>
                                           <p:spTgt spid="4">
                                             <p:txEl>
-                                              <p:pRg st="8" end="8"/>
+                                              <p:pRg st="9" end="9"/>
                                             </p:txEl>
                                           </p:spTgt>
                                         </p:tgtEl>
@@ -31537,7 +31528,7 @@
                                         <p:tgtEl>
                                           <p:spTgt spid="4">
                                             <p:txEl>
-                                              <p:pRg st="8" end="8"/>
+                                              <p:pRg st="9" end="9"/>
                                             </p:txEl>
                                           </p:spTgt>
                                         </p:tgtEl>
@@ -31580,7 +31571,7 @@
                                         <p:tgtEl>
                                           <p:spTgt spid="4">
                                             <p:txEl>
-                                              <p:pRg st="9" end="9"/>
+                                              <p:pRg st="15" end="15"/>
                                             </p:txEl>
                                           </p:spTgt>
                                         </p:tgtEl>
@@ -31598,7 +31589,7 @@
                                         <p:tgtEl>
                                           <p:spTgt spid="4">
                                             <p:txEl>
-                                              <p:pRg st="9" end="9"/>
+                                              <p:pRg st="15" end="15"/>
                                             </p:txEl>
                                           </p:spTgt>
                                         </p:tgtEl>
@@ -31641,7 +31632,7 @@
                                         <p:tgtEl>
                                           <p:spTgt spid="4">
                                             <p:txEl>
-                                              <p:pRg st="15" end="15"/>
+                                              <p:pRg st="10" end="10"/>
                                             </p:txEl>
                                           </p:spTgt>
                                         </p:tgtEl>
@@ -31659,7 +31650,7 @@
                                         <p:tgtEl>
                                           <p:spTgt spid="4">
                                             <p:txEl>
-                                              <p:pRg st="15" end="15"/>
+                                              <p:pRg st="10" end="10"/>
                                             </p:txEl>
                                           </p:spTgt>
                                         </p:tgtEl>
@@ -31702,7 +31693,7 @@
                                         <p:tgtEl>
                                           <p:spTgt spid="4">
                                             <p:txEl>
-                                              <p:pRg st="10" end="10"/>
+                                              <p:pRg st="16" end="16"/>
                                             </p:txEl>
                                           </p:spTgt>
                                         </p:tgtEl>
@@ -31720,8 +31711,47 @@
                                         <p:tgtEl>
                                           <p:spTgt spid="4">
                                             <p:txEl>
-                                              <p:pRg st="10" end="10"/>
-                                            </p:txEl>
+                                              <p:pRg st="16" end="16"/>
+                                            </p:txEl>
+                                          </p:spTgt>
+                                        </p:tgtEl>
+                                      </p:cBhvr>
+                                    </p:animEffect>
+                                  </p:childTnLst>
+                                </p:cTn>
+                              </p:par>
+                              <p:par>
+                                <p:cTn id="107" presetID="22" presetClass="entr" presetSubtype="8" fill="hold" grpId="0" nodeType="withEffect">
+                                  <p:stCondLst>
+                                    <p:cond delay="0"/>
+                                  </p:stCondLst>
+                                  <p:childTnLst>
+                                    <p:set>
+                                      <p:cBhvr>
+                                        <p:cTn id="108" dur="1" fill="hold">
+                                          <p:stCondLst>
+                                            <p:cond delay="0"/>
+                                          </p:stCondLst>
+                                        </p:cTn>
+                                        <p:tgtEl>
+                                          <p:spTgt spid="5">
+                                            <p:bg/>
+                                          </p:spTgt>
+                                        </p:tgtEl>
+                                        <p:attrNameLst>
+                                          <p:attrName>style.visibility</p:attrName>
+                                        </p:attrNameLst>
+                                      </p:cBhvr>
+                                      <p:to>
+                                        <p:strVal val="visible"/>
+                                      </p:to>
+                                    </p:set>
+                                    <p:animEffect transition="in" filter="wipe(left)">
+                                      <p:cBhvr>
+                                        <p:cTn id="109" dur="500"/>
+                                        <p:tgtEl>
+                                          <p:spTgt spid="5">
+                                            <p:bg/>
                                           </p:spTgt>
                                         </p:tgtEl>
                                       </p:cBhvr>
@@ -31736,34 +31766,34 @@
                     </p:cTn>
                   </p:par>
                   <p:par>
-                    <p:cTn id="107" fill="hold">
+                    <p:cTn id="110" fill="hold">
                       <p:stCondLst>
                         <p:cond delay="indefinite"/>
                       </p:stCondLst>
                       <p:childTnLst>
                         <p:par>
-                          <p:cTn id="108" fill="hold">
+                          <p:cTn id="111" fill="hold">
                             <p:stCondLst>
                               <p:cond delay="0"/>
                             </p:stCondLst>
                             <p:childTnLst>
                               <p:par>
-                                <p:cTn id="109" presetID="22" presetClass="entr" presetSubtype="8" fill="hold" grpId="0" nodeType="clickEffect">
+                                <p:cTn id="112" presetID="22" presetClass="entr" presetSubtype="8" fill="hold" grpId="0" nodeType="clickEffect">
                                   <p:stCondLst>
                                     <p:cond delay="0"/>
                                   </p:stCondLst>
                                   <p:childTnLst>
                                     <p:set>
                                       <p:cBhvr>
-                                        <p:cTn id="110" dur="1" fill="hold">
+                                        <p:cTn id="113" dur="1" fill="hold">
                                           <p:stCondLst>
                                             <p:cond delay="0"/>
                                           </p:stCondLst>
                                         </p:cTn>
                                         <p:tgtEl>
-                                          <p:spTgt spid="4">
-                                            <p:txEl>
-                                              <p:pRg st="16" end="16"/>
+                                          <p:spTgt spid="5">
+                                            <p:txEl>
+                                              <p:pRg st="0" end="0"/>
                                             </p:txEl>
                                           </p:spTgt>
                                         </p:tgtEl>
@@ -31777,51 +31807,12 @@
                                     </p:set>
                                     <p:animEffect transition="in" filter="wipe(left)">
                                       <p:cBhvr>
-                                        <p:cTn id="111" dur="500"/>
-                                        <p:tgtEl>
-                                          <p:spTgt spid="4">
-                                            <p:txEl>
-                                              <p:pRg st="16" end="16"/>
-                                            </p:txEl>
-                                          </p:spTgt>
-                                        </p:tgtEl>
-                                      </p:cBhvr>
-                                    </p:animEffect>
-                                  </p:childTnLst>
-                                </p:cTn>
-                              </p:par>
-                              <p:par>
-                                <p:cTn id="112" presetID="22" presetClass="entr" presetSubtype="8" fill="hold" grpId="0" nodeType="withEffect">
-                                  <p:stCondLst>
-                                    <p:cond delay="0"/>
-                                  </p:stCondLst>
-                                  <p:childTnLst>
-                                    <p:set>
-                                      <p:cBhvr>
-                                        <p:cTn id="113" dur="1" fill="hold">
-                                          <p:stCondLst>
-                                            <p:cond delay="0"/>
-                                          </p:stCondLst>
-                                        </p:cTn>
+                                        <p:cTn id="114" dur="500"/>
                                         <p:tgtEl>
                                           <p:spTgt spid="5">
-                                            <p:bg/>
-                                          </p:spTgt>
-                                        </p:tgtEl>
-                                        <p:attrNameLst>
-                                          <p:attrName>style.visibility</p:attrName>
-                                        </p:attrNameLst>
-                                      </p:cBhvr>
-                                      <p:to>
-                                        <p:strVal val="visible"/>
-                                      </p:to>
-                                    </p:set>
-                                    <p:animEffect transition="in" filter="wipe(left)">
-                                      <p:cBhvr>
-                                        <p:cTn id="114" dur="500"/>
-                                        <p:tgtEl>
-                                          <p:spTgt spid="5">
-                                            <p:bg/>
+                                            <p:txEl>
+                                              <p:pRg st="0" end="0"/>
+                                            </p:txEl>
                                           </p:spTgt>
                                         </p:tgtEl>
                                       </p:cBhvr>
@@ -31863,7 +31854,7 @@
                                         <p:tgtEl>
                                           <p:spTgt spid="5">
                                             <p:txEl>
-                                              <p:pRg st="0" end="0"/>
+                                              <p:pRg st="1" end="1"/>
                                             </p:txEl>
                                           </p:spTgt>
                                         </p:tgtEl>
@@ -31881,7 +31872,7 @@
                                         <p:tgtEl>
                                           <p:spTgt spid="5">
                                             <p:txEl>
-                                              <p:pRg st="0" end="0"/>
+                                              <p:pRg st="1" end="1"/>
                                             </p:txEl>
                                           </p:spTgt>
                                         </p:tgtEl>
@@ -31924,7 +31915,7 @@
                                         <p:tgtEl>
                                           <p:spTgt spid="5">
                                             <p:txEl>
-                                              <p:pRg st="1" end="1"/>
+                                              <p:pRg st="2" end="2"/>
                                             </p:txEl>
                                           </p:spTgt>
                                         </p:tgtEl>
@@ -31942,7 +31933,7 @@
                                         <p:tgtEl>
                                           <p:spTgt spid="5">
                                             <p:txEl>
-                                              <p:pRg st="1" end="1"/>
+                                              <p:pRg st="2" end="2"/>
                                             </p:txEl>
                                           </p:spTgt>
                                         </p:tgtEl>
@@ -31985,7 +31976,7 @@
                                         <p:tgtEl>
                                           <p:spTgt spid="5">
                                             <p:txEl>
-                                              <p:pRg st="2" end="2"/>
+                                              <p:pRg st="3" end="3"/>
                                             </p:txEl>
                                           </p:spTgt>
                                         </p:tgtEl>
@@ -32003,7 +31994,7 @@
                                         <p:tgtEl>
                                           <p:spTgt spid="5">
                                             <p:txEl>
-                                              <p:pRg st="2" end="2"/>
+                                              <p:pRg st="3" end="3"/>
                                             </p:txEl>
                                           </p:spTgt>
                                         </p:tgtEl>
@@ -32046,7 +32037,7 @@
                                         <p:tgtEl>
                                           <p:spTgt spid="5">
                                             <p:txEl>
-                                              <p:pRg st="3" end="3"/>
+                                              <p:pRg st="4" end="4"/>
                                             </p:txEl>
                                           </p:spTgt>
                                         </p:tgtEl>
@@ -32064,7 +32055,7 @@
                                         <p:tgtEl>
                                           <p:spTgt spid="5">
                                             <p:txEl>
-                                              <p:pRg st="3" end="3"/>
+                                              <p:pRg st="4" end="4"/>
                                             </p:txEl>
                                           </p:spTgt>
                                         </p:tgtEl>
@@ -32107,7 +32098,7 @@
                                         <p:tgtEl>
                                           <p:spTgt spid="5">
                                             <p:txEl>
-                                              <p:pRg st="4" end="4"/>
+                                              <p:pRg st="5" end="5"/>
                                             </p:txEl>
                                           </p:spTgt>
                                         </p:tgtEl>
@@ -32125,7 +32116,7 @@
                                         <p:tgtEl>
                                           <p:spTgt spid="5">
                                             <p:txEl>
-                                              <p:pRg st="4" end="4"/>
+                                              <p:pRg st="5" end="5"/>
                                             </p:txEl>
                                           </p:spTgt>
                                         </p:tgtEl>
@@ -32168,7 +32159,7 @@
                                         <p:tgtEl>
                                           <p:spTgt spid="5">
                                             <p:txEl>
-                                              <p:pRg st="5" end="5"/>
+                                              <p:pRg st="6" end="6"/>
                                             </p:txEl>
                                           </p:spTgt>
                                         </p:tgtEl>
@@ -32186,7 +32177,50 @@
                                         <p:tgtEl>
                                           <p:spTgt spid="5">
                                             <p:txEl>
-                                              <p:pRg st="5" end="5"/>
+                                              <p:pRg st="6" end="6"/>
+                                            </p:txEl>
+                                          </p:spTgt>
+                                        </p:tgtEl>
+                                      </p:cBhvr>
+                                    </p:animEffect>
+                                  </p:childTnLst>
+                                </p:cTn>
+                              </p:par>
+                              <p:par>
+                                <p:cTn id="145" presetID="22" presetClass="entr" presetSubtype="8" fill="hold" grpId="0" nodeType="withEffect">
+                                  <p:stCondLst>
+                                    <p:cond delay="0"/>
+                                  </p:stCondLst>
+                                  <p:childTnLst>
+                                    <p:set>
+                                      <p:cBhvr>
+                                        <p:cTn id="146" dur="1" fill="hold">
+                                          <p:stCondLst>
+                                            <p:cond delay="0"/>
+                                          </p:stCondLst>
+                                        </p:cTn>
+                                        <p:tgtEl>
+                                          <p:spTgt spid="5">
+                                            <p:txEl>
+                                              <p:pRg st="7" end="7"/>
+                                            </p:txEl>
+                                          </p:spTgt>
+                                        </p:tgtEl>
+                                        <p:attrNameLst>
+                                          <p:attrName>style.visibility</p:attrName>
+                                        </p:attrNameLst>
+                                      </p:cBhvr>
+                                      <p:to>
+                                        <p:strVal val="visible"/>
+                                      </p:to>
+                                    </p:set>
+                                    <p:animEffect transition="in" filter="wipe(left)">
+                                      <p:cBhvr>
+                                        <p:cTn id="147" dur="500"/>
+                                        <p:tgtEl>
+                                          <p:spTgt spid="5">
+                                            <p:txEl>
+                                              <p:pRg st="7" end="7"/>
                                             </p:txEl>
                                           </p:spTgt>
                                         </p:tgtEl>
@@ -32202,26 +32236,26 @@
                     </p:cTn>
                   </p:par>
                   <p:par>
-                    <p:cTn id="145" fill="hold">
+                    <p:cTn id="148" fill="hold">
                       <p:stCondLst>
                         <p:cond delay="indefinite"/>
                       </p:stCondLst>
                       <p:childTnLst>
                         <p:par>
-                          <p:cTn id="146" fill="hold">
+                          <p:cTn id="149" fill="hold">
                             <p:stCondLst>
                               <p:cond delay="0"/>
                             </p:stCondLst>
                             <p:childTnLst>
                               <p:par>
-                                <p:cTn id="147" presetID="22" presetClass="entr" presetSubtype="8" fill="hold" grpId="0" nodeType="clickEffect">
+                                <p:cTn id="150" presetID="22" presetClass="entr" presetSubtype="8" fill="hold" grpId="0" nodeType="clickEffect">
                                   <p:stCondLst>
                                     <p:cond delay="0"/>
                                   </p:stCondLst>
                                   <p:childTnLst>
                                     <p:set>
                                       <p:cBhvr>
-                                        <p:cTn id="148" dur="1" fill="hold">
+                                        <p:cTn id="151" dur="1" fill="hold">
                                           <p:stCondLst>
                                             <p:cond delay="0"/>
                                           </p:stCondLst>
@@ -32229,7 +32263,7 @@
                                         <p:tgtEl>
                                           <p:spTgt spid="5">
                                             <p:txEl>
-                                              <p:pRg st="6" end="6"/>
+                                              <p:pRg st="8" end="8"/>
                                             </p:txEl>
                                           </p:spTgt>
                                         </p:tgtEl>
@@ -32243,54 +32277,11 @@
                                     </p:set>
                                     <p:animEffect transition="in" filter="wipe(left)">
                                       <p:cBhvr>
-                                        <p:cTn id="149" dur="500"/>
+                                        <p:cTn id="152" dur="500"/>
                                         <p:tgtEl>
                                           <p:spTgt spid="5">
                                             <p:txEl>
-                                              <p:pRg st="6" end="6"/>
-                                            </p:txEl>
-                                          </p:spTgt>
-                                        </p:tgtEl>
-                                      </p:cBhvr>
-                                    </p:animEffect>
-                                  </p:childTnLst>
-                                </p:cTn>
-                              </p:par>
-                              <p:par>
-                                <p:cTn id="150" presetID="22" presetClass="entr" presetSubtype="8" fill="hold" grpId="0" nodeType="withEffect">
-                                  <p:stCondLst>
-                                    <p:cond delay="0"/>
-                                  </p:stCondLst>
-                                  <p:childTnLst>
-                                    <p:set>
-                                      <p:cBhvr>
-                                        <p:cTn id="151" dur="1" fill="hold">
-                                          <p:stCondLst>
-                                            <p:cond delay="0"/>
-                                          </p:stCondLst>
-                                        </p:cTn>
-                                        <p:tgtEl>
-                                          <p:spTgt spid="5">
-                                            <p:txEl>
-                                              <p:pRg st="7" end="7"/>
-                                            </p:txEl>
-                                          </p:spTgt>
-                                        </p:tgtEl>
-                                        <p:attrNameLst>
-                                          <p:attrName>style.visibility</p:attrName>
-                                        </p:attrNameLst>
-                                      </p:cBhvr>
-                                      <p:to>
-                                        <p:strVal val="visible"/>
-                                      </p:to>
-                                    </p:set>
-                                    <p:animEffect transition="in" filter="wipe(left)">
-                                      <p:cBhvr>
-                                        <p:cTn id="152" dur="500"/>
-                                        <p:tgtEl>
-                                          <p:spTgt spid="5">
-                                            <p:txEl>
-                                              <p:pRg st="7" end="7"/>
+                                              <p:pRg st="8" end="8"/>
                                             </p:txEl>
                                           </p:spTgt>
                                         </p:tgtEl>
@@ -32333,7 +32324,7 @@
                                         <p:tgtEl>
                                           <p:spTgt spid="5">
                                             <p:txEl>
-                                              <p:pRg st="8" end="8"/>
+                                              <p:pRg st="9" end="9"/>
                                             </p:txEl>
                                           </p:spTgt>
                                         </p:tgtEl>
@@ -32351,7 +32342,7 @@
                                         <p:tgtEl>
                                           <p:spTgt spid="5">
                                             <p:txEl>
-                                              <p:pRg st="8" end="8"/>
+                                              <p:pRg st="9" end="9"/>
                                             </p:txEl>
                                           </p:spTgt>
                                         </p:tgtEl>
@@ -32394,7 +32385,7 @@
                                         <p:tgtEl>
                                           <p:spTgt spid="5">
                                             <p:txEl>
-                                              <p:pRg st="9" end="9"/>
+                                              <p:pRg st="10" end="10"/>
                                             </p:txEl>
                                           </p:spTgt>
                                         </p:tgtEl>
@@ -32412,7 +32403,50 @@
                                         <p:tgtEl>
                                           <p:spTgt spid="5">
                                             <p:txEl>
-                                              <p:pRg st="9" end="9"/>
+                                              <p:pRg st="10" end="10"/>
+                                            </p:txEl>
+                                          </p:spTgt>
+                                        </p:tgtEl>
+                                      </p:cBhvr>
+                                    </p:animEffect>
+                                  </p:childTnLst>
+                                </p:cTn>
+                              </p:par>
+                              <p:par>
+                                <p:cTn id="163" presetID="22" presetClass="entr" presetSubtype="8" fill="hold" grpId="0" nodeType="withEffect">
+                                  <p:stCondLst>
+                                    <p:cond delay="0"/>
+                                  </p:stCondLst>
+                                  <p:childTnLst>
+                                    <p:set>
+                                      <p:cBhvr>
+                                        <p:cTn id="164" dur="1" fill="hold">
+                                          <p:stCondLst>
+                                            <p:cond delay="0"/>
+                                          </p:stCondLst>
+                                        </p:cTn>
+                                        <p:tgtEl>
+                                          <p:spTgt spid="5">
+                                            <p:txEl>
+                                              <p:pRg st="11" end="11"/>
+                                            </p:txEl>
+                                          </p:spTgt>
+                                        </p:tgtEl>
+                                        <p:attrNameLst>
+                                          <p:attrName>style.visibility</p:attrName>
+                                        </p:attrNameLst>
+                                      </p:cBhvr>
+                                      <p:to>
+                                        <p:strVal val="visible"/>
+                                      </p:to>
+                                    </p:set>
+                                    <p:animEffect transition="in" filter="wipe(left)">
+                                      <p:cBhvr>
+                                        <p:cTn id="165" dur="500"/>
+                                        <p:tgtEl>
+                                          <p:spTgt spid="5">
+                                            <p:txEl>
+                                              <p:pRg st="11" end="11"/>
                                             </p:txEl>
                                           </p:spTgt>
                                         </p:tgtEl>
@@ -32428,26 +32462,26 @@
                     </p:cTn>
                   </p:par>
                   <p:par>
-                    <p:cTn id="163" fill="hold">
+                    <p:cTn id="166" fill="hold">
                       <p:stCondLst>
                         <p:cond delay="indefinite"/>
                       </p:stCondLst>
                       <p:childTnLst>
                         <p:par>
-                          <p:cTn id="164" fill="hold">
+                          <p:cTn id="167" fill="hold">
                             <p:stCondLst>
                               <p:cond delay="0"/>
                             </p:stCondLst>
                             <p:childTnLst>
                               <p:par>
-                                <p:cTn id="165" presetID="22" presetClass="entr" presetSubtype="8" fill="hold" grpId="0" nodeType="clickEffect">
+                                <p:cTn id="168" presetID="22" presetClass="entr" presetSubtype="8" fill="hold" grpId="0" nodeType="clickEffect">
                                   <p:stCondLst>
                                     <p:cond delay="0"/>
                                   </p:stCondLst>
                                   <p:childTnLst>
                                     <p:set>
                                       <p:cBhvr>
-                                        <p:cTn id="166" dur="1" fill="hold">
+                                        <p:cTn id="169" dur="1" fill="hold">
                                           <p:stCondLst>
                                             <p:cond delay="0"/>
                                           </p:stCondLst>
@@ -32455,7 +32489,7 @@
                                         <p:tgtEl>
                                           <p:spTgt spid="5">
                                             <p:txEl>
-                                              <p:pRg st="10" end="10"/>
+                                              <p:pRg st="12" end="12"/>
                                             </p:txEl>
                                           </p:spTgt>
                                         </p:tgtEl>
@@ -32469,54 +32503,11 @@
                                     </p:set>
                                     <p:animEffect transition="in" filter="wipe(left)">
                                       <p:cBhvr>
-                                        <p:cTn id="167" dur="500"/>
+                                        <p:cTn id="170" dur="500"/>
                                         <p:tgtEl>
                                           <p:spTgt spid="5">
                                             <p:txEl>
-                                              <p:pRg st="10" end="10"/>
-                                            </p:txEl>
-                                          </p:spTgt>
-                                        </p:tgtEl>
-                                      </p:cBhvr>
-                                    </p:animEffect>
-                                  </p:childTnLst>
-                                </p:cTn>
-                              </p:par>
-                              <p:par>
-                                <p:cTn id="168" presetID="22" presetClass="entr" presetSubtype="8" fill="hold" grpId="0" nodeType="withEffect">
-                                  <p:stCondLst>
-                                    <p:cond delay="0"/>
-                                  </p:stCondLst>
-                                  <p:childTnLst>
-                                    <p:set>
-                                      <p:cBhvr>
-                                        <p:cTn id="169" dur="1" fill="hold">
-                                          <p:stCondLst>
-                                            <p:cond delay="0"/>
-                                          </p:stCondLst>
-                                        </p:cTn>
-                                        <p:tgtEl>
-                                          <p:spTgt spid="5">
-                                            <p:txEl>
-                                              <p:pRg st="11" end="11"/>
-                                            </p:txEl>
-                                          </p:spTgt>
-                                        </p:tgtEl>
-                                        <p:attrNameLst>
-                                          <p:attrName>style.visibility</p:attrName>
-                                        </p:attrNameLst>
-                                      </p:cBhvr>
-                                      <p:to>
-                                        <p:strVal val="visible"/>
-                                      </p:to>
-                                    </p:set>
-                                    <p:animEffect transition="in" filter="wipe(left)">
-                                      <p:cBhvr>
-                                        <p:cTn id="170" dur="500"/>
-                                        <p:tgtEl>
-                                          <p:spTgt spid="5">
-                                            <p:txEl>
-                                              <p:pRg st="11" end="11"/>
+                                              <p:pRg st="12" end="12"/>
                                             </p:txEl>
                                           </p:spTgt>
                                         </p:tgtEl>
@@ -32559,7 +32550,7 @@
                                         <p:tgtEl>
                                           <p:spTgt spid="5">
                                             <p:txEl>
-                                              <p:pRg st="12" end="12"/>
+                                              <p:pRg st="13" end="13"/>
                                             </p:txEl>
                                           </p:spTgt>
                                         </p:tgtEl>
@@ -32577,7 +32568,7 @@
                                         <p:tgtEl>
                                           <p:spTgt spid="5">
                                             <p:txEl>
-                                              <p:pRg st="12" end="12"/>
+                                              <p:pRg st="13" end="13"/>
                                             </p:txEl>
                                           </p:spTgt>
                                         </p:tgtEl>
@@ -32620,7 +32611,7 @@
                                         <p:tgtEl>
                                           <p:spTgt spid="5">
                                             <p:txEl>
-                                              <p:pRg st="13" end="13"/>
+                                              <p:pRg st="14" end="14"/>
                                             </p:txEl>
                                           </p:spTgt>
                                         </p:tgtEl>
@@ -32638,7 +32629,7 @@
                                         <p:tgtEl>
                                           <p:spTgt spid="5">
                                             <p:txEl>
-                                              <p:pRg st="13" end="13"/>
+                                              <p:pRg st="14" end="14"/>
                                             </p:txEl>
                                           </p:spTgt>
                                         </p:tgtEl>
@@ -32681,7 +32672,7 @@
                                         <p:tgtEl>
                                           <p:spTgt spid="5">
                                             <p:txEl>
-                                              <p:pRg st="14" end="14"/>
+                                              <p:pRg st="15" end="15"/>
                                             </p:txEl>
                                           </p:spTgt>
                                         </p:tgtEl>
@@ -32699,7 +32690,7 @@
                                         <p:tgtEl>
                                           <p:spTgt spid="5">
                                             <p:txEl>
-                                              <p:pRg st="14" end="14"/>
+                                              <p:pRg st="15" end="15"/>
                                             </p:txEl>
                                           </p:spTgt>
                                         </p:tgtEl>
@@ -32742,7 +32733,7 @@
                                         <p:tgtEl>
                                           <p:spTgt spid="5">
                                             <p:txEl>
-                                              <p:pRg st="15" end="15"/>
+                                              <p:pRg st="16" end="16"/>
                                             </p:txEl>
                                           </p:spTgt>
                                         </p:tgtEl>
@@ -32760,7 +32751,7 @@
                                         <p:tgtEl>
                                           <p:spTgt spid="5">
                                             <p:txEl>
-                                              <p:pRg st="15" end="15"/>
+                                              <p:pRg st="16" end="16"/>
                                             </p:txEl>
                                           </p:spTgt>
                                         </p:tgtEl>
@@ -32803,7 +32794,7 @@
                                         <p:tgtEl>
                                           <p:spTgt spid="5">
                                             <p:txEl>
-                                              <p:pRg st="16" end="16"/>
+                                              <p:pRg st="17" end="17"/>
                                             </p:txEl>
                                           </p:spTgt>
                                         </p:tgtEl>
@@ -32818,67 +32809,6 @@
                                     <p:animEffect transition="in" filter="wipe(left)">
                                       <p:cBhvr>
                                         <p:cTn id="195" dur="500"/>
-                                        <p:tgtEl>
-                                          <p:spTgt spid="5">
-                                            <p:txEl>
-                                              <p:pRg st="16" end="16"/>
-                                            </p:txEl>
-                                          </p:spTgt>
-                                        </p:tgtEl>
-                                      </p:cBhvr>
-                                    </p:animEffect>
-                                  </p:childTnLst>
-                                </p:cTn>
-                              </p:par>
-                            </p:childTnLst>
-                          </p:cTn>
-                        </p:par>
-                      </p:childTnLst>
-                    </p:cTn>
-                  </p:par>
-                  <p:par>
-                    <p:cTn id="196" fill="hold">
-                      <p:stCondLst>
-                        <p:cond delay="indefinite"/>
-                      </p:stCondLst>
-                      <p:childTnLst>
-                        <p:par>
-                          <p:cTn id="197" fill="hold">
-                            <p:stCondLst>
-                              <p:cond delay="0"/>
-                            </p:stCondLst>
-                            <p:childTnLst>
-                              <p:par>
-                                <p:cTn id="198" presetID="22" presetClass="entr" presetSubtype="8" fill="hold" grpId="0" nodeType="clickEffect">
-                                  <p:stCondLst>
-                                    <p:cond delay="0"/>
-                                  </p:stCondLst>
-                                  <p:childTnLst>
-                                    <p:set>
-                                      <p:cBhvr>
-                                        <p:cTn id="199" dur="1" fill="hold">
-                                          <p:stCondLst>
-                                            <p:cond delay="0"/>
-                                          </p:stCondLst>
-                                        </p:cTn>
-                                        <p:tgtEl>
-                                          <p:spTgt spid="5">
-                                            <p:txEl>
-                                              <p:pRg st="17" end="17"/>
-                                            </p:txEl>
-                                          </p:spTgt>
-                                        </p:tgtEl>
-                                        <p:attrNameLst>
-                                          <p:attrName>style.visibility</p:attrName>
-                                        </p:attrNameLst>
-                                      </p:cBhvr>
-                                      <p:to>
-                                        <p:strVal val="visible"/>
-                                      </p:to>
-                                    </p:set>
-                                    <p:animEffect transition="in" filter="wipe(left)">
-                                      <p:cBhvr>
-                                        <p:cTn id="200" dur="500"/>
                                         <p:tgtEl>
                                           <p:spTgt spid="5">
                                             <p:txEl>
@@ -32921,8 +32851,8 @@
     <p:bldLst>
       <p:bldP spid="5" grpId="0" uiExpand="1" build="p" animBg="1"/>
       <p:bldP spid="4" grpId="0" uiExpand="1" build="p" animBg="1"/>
-      <p:bldP spid="6" grpId="0" build="p" animBg="1"/>
-      <p:bldP spid="6" grpId="1" build="allAtOnce" animBg="1"/>
+      <p:bldP spid="6" grpId="0" build="p"/>
+      <p:bldP spid="6" grpId="1" build="allAtOnce"/>
     </p:bldLst>
   </p:timing>
 </p:sld>

</xml_diff>